<commit_message>
update readme and pictures for video module 1
</commit_message>
<xml_diff>
--- a/module_1/module1.pptx
+++ b/module_1/module1.pptx
@@ -7,6 +7,7 @@
   <p:sldIdLst>
     <p:sldId id="256" r:id="rId2"/>
     <p:sldId id="257" r:id="rId3"/>
+    <p:sldId id="258" r:id="rId4"/>
   </p:sldIdLst>
   <p:sldSz cx="12192000" cy="6858000"/>
   <p:notesSz cx="6858000" cy="9144000"/>
@@ -105,6 +106,11 @@
       </a:defRPr>
     </a:lvl9pPr>
   </p:defaultTextStyle>
+  <p:extLst>
+    <p:ext uri="{EFAFB233-063F-42B5-8137-9DF3F51BA10A}">
+      <p15:sldGuideLst xmlns:p15="http://schemas.microsoft.com/office/powerpoint/2012/main"/>
+    </p:ext>
+  </p:extLst>
 </p:presentation>
 </file>
 
@@ -239,7 +245,7 @@
           <a:p>
             <a:fld id="{109CFA02-0FCD-4484-A8FF-E99C95F0D73C}" type="datetimeFigureOut">
               <a:rPr lang="ru-RU" smtClean="0"/>
-              <a:t>28.05.2022</a:t>
+              <a:t>06.06.2022</a:t>
             </a:fld>
             <a:endParaRPr lang="ru-RU"/>
           </a:p>
@@ -409,7 +415,7 @@
           <a:p>
             <a:fld id="{109CFA02-0FCD-4484-A8FF-E99C95F0D73C}" type="datetimeFigureOut">
               <a:rPr lang="ru-RU" smtClean="0"/>
-              <a:t>28.05.2022</a:t>
+              <a:t>06.06.2022</a:t>
             </a:fld>
             <a:endParaRPr lang="ru-RU"/>
           </a:p>
@@ -589,7 +595,7 @@
           <a:p>
             <a:fld id="{109CFA02-0FCD-4484-A8FF-E99C95F0D73C}" type="datetimeFigureOut">
               <a:rPr lang="ru-RU" smtClean="0"/>
-              <a:t>28.05.2022</a:t>
+              <a:t>06.06.2022</a:t>
             </a:fld>
             <a:endParaRPr lang="ru-RU"/>
           </a:p>
@@ -759,7 +765,7 @@
           <a:p>
             <a:fld id="{109CFA02-0FCD-4484-A8FF-E99C95F0D73C}" type="datetimeFigureOut">
               <a:rPr lang="ru-RU" smtClean="0"/>
-              <a:t>28.05.2022</a:t>
+              <a:t>06.06.2022</a:t>
             </a:fld>
             <a:endParaRPr lang="ru-RU"/>
           </a:p>
@@ -1005,7 +1011,7 @@
           <a:p>
             <a:fld id="{109CFA02-0FCD-4484-A8FF-E99C95F0D73C}" type="datetimeFigureOut">
               <a:rPr lang="ru-RU" smtClean="0"/>
-              <a:t>28.05.2022</a:t>
+              <a:t>06.06.2022</a:t>
             </a:fld>
             <a:endParaRPr lang="ru-RU"/>
           </a:p>
@@ -1237,7 +1243,7 @@
           <a:p>
             <a:fld id="{109CFA02-0FCD-4484-A8FF-E99C95F0D73C}" type="datetimeFigureOut">
               <a:rPr lang="ru-RU" smtClean="0"/>
-              <a:t>28.05.2022</a:t>
+              <a:t>06.06.2022</a:t>
             </a:fld>
             <a:endParaRPr lang="ru-RU"/>
           </a:p>
@@ -1604,7 +1610,7 @@
           <a:p>
             <a:fld id="{109CFA02-0FCD-4484-A8FF-E99C95F0D73C}" type="datetimeFigureOut">
               <a:rPr lang="ru-RU" smtClean="0"/>
-              <a:t>28.05.2022</a:t>
+              <a:t>06.06.2022</a:t>
             </a:fld>
             <a:endParaRPr lang="ru-RU"/>
           </a:p>
@@ -1722,7 +1728,7 @@
           <a:p>
             <a:fld id="{109CFA02-0FCD-4484-A8FF-E99C95F0D73C}" type="datetimeFigureOut">
               <a:rPr lang="ru-RU" smtClean="0"/>
-              <a:t>28.05.2022</a:t>
+              <a:t>06.06.2022</a:t>
             </a:fld>
             <a:endParaRPr lang="ru-RU"/>
           </a:p>
@@ -1817,7 +1823,7 @@
           <a:p>
             <a:fld id="{109CFA02-0FCD-4484-A8FF-E99C95F0D73C}" type="datetimeFigureOut">
               <a:rPr lang="ru-RU" smtClean="0"/>
-              <a:t>28.05.2022</a:t>
+              <a:t>06.06.2022</a:t>
             </a:fld>
             <a:endParaRPr lang="ru-RU"/>
           </a:p>
@@ -2094,7 +2100,7 @@
           <a:p>
             <a:fld id="{109CFA02-0FCD-4484-A8FF-E99C95F0D73C}" type="datetimeFigureOut">
               <a:rPr lang="ru-RU" smtClean="0"/>
-              <a:t>28.05.2022</a:t>
+              <a:t>06.06.2022</a:t>
             </a:fld>
             <a:endParaRPr lang="ru-RU"/>
           </a:p>
@@ -2347,7 +2353,7 @@
           <a:p>
             <a:fld id="{109CFA02-0FCD-4484-A8FF-E99C95F0D73C}" type="datetimeFigureOut">
               <a:rPr lang="ru-RU" smtClean="0"/>
-              <a:t>28.05.2022</a:t>
+              <a:t>06.06.2022</a:t>
             </a:fld>
             <a:endParaRPr lang="ru-RU"/>
           </a:p>
@@ -2560,7 +2566,7 @@
           <a:p>
             <a:fld id="{109CFA02-0FCD-4484-A8FF-E99C95F0D73C}" type="datetimeFigureOut">
               <a:rPr lang="ru-RU" smtClean="0"/>
-              <a:t>28.05.2022</a:t>
+              <a:t>06.06.2022</a:t>
             </a:fld>
             <a:endParaRPr lang="ru-RU"/>
           </a:p>
@@ -3098,6 +3104,84 @@
 </p:sld>
 </file>
 
+<file path=ppt/slides/slide3.xml><?xml version="1.0" encoding="utf-8"?>
+<p:sld xmlns:a="http://schemas.openxmlformats.org/drawingml/2006/main" xmlns:r="http://schemas.openxmlformats.org/officeDocument/2006/relationships" xmlns:p="http://schemas.openxmlformats.org/presentationml/2006/main">
+  <p:cSld>
+    <p:spTree>
+      <p:nvGrpSpPr>
+        <p:cNvPr id="1" name=""/>
+        <p:cNvGrpSpPr/>
+        <p:nvPr/>
+      </p:nvGrpSpPr>
+      <p:grpSpPr>
+        <a:xfrm>
+          <a:off x="0" y="0"/>
+          <a:ext cx="0" cy="0"/>
+          <a:chOff x="0" y="0"/>
+          <a:chExt cx="0" cy="0"/>
+        </a:xfrm>
+      </p:grpSpPr>
+      <p:sp>
+        <p:nvSpPr>
+          <p:cNvPr id="2" name="Заголовок 1"/>
+          <p:cNvSpPr>
+            <a:spLocks noGrp="1"/>
+          </p:cNvSpPr>
+          <p:nvPr>
+            <p:ph type="title"/>
+          </p:nvPr>
+        </p:nvSpPr>
+        <p:spPr/>
+        <p:txBody>
+          <a:bodyPr/>
+          <a:lstStyle/>
+          <a:p>
+            <a:endParaRPr lang="ru-RU"/>
+          </a:p>
+        </p:txBody>
+      </p:sp>
+      <p:pic>
+        <p:nvPicPr>
+          <p:cNvPr id="4" name="Объект 3"/>
+          <p:cNvPicPr>
+            <a:picLocks noGrp="1" noChangeAspect="1"/>
+          </p:cNvPicPr>
+          <p:nvPr>
+            <p:ph idx="1"/>
+          </p:nvPr>
+        </p:nvPicPr>
+        <p:blipFill>
+          <a:blip r:embed="rId2">
+            <a:extLst>
+              <a:ext uri="{28A0092B-C50C-407E-A947-70E740481C1C}">
+                <a14:useLocalDpi xmlns:a14="http://schemas.microsoft.com/office/drawing/2010/main" val="0"/>
+              </a:ext>
+            </a:extLst>
+          </a:blip>
+          <a:stretch>
+            <a:fillRect/>
+          </a:stretch>
+        </p:blipFill>
+        <p:spPr>
+          <a:xfrm>
+            <a:off x="3629132" y="1794094"/>
+            <a:ext cx="4933735" cy="4351338"/>
+          </a:xfrm>
+        </p:spPr>
+      </p:pic>
+    </p:spTree>
+    <p:extLst>
+      <p:ext uri="{BB962C8B-B14F-4D97-AF65-F5344CB8AC3E}">
+        <p14:creationId xmlns:p14="http://schemas.microsoft.com/office/powerpoint/2010/main" val="322109319"/>
+      </p:ext>
+    </p:extLst>
+  </p:cSld>
+  <p:clrMapOvr>
+    <a:masterClrMapping/>
+  </p:clrMapOvr>
+</p:sld>
+</file>
+
 <file path=ppt/theme/theme1.xml><?xml version="1.0" encoding="utf-8"?>
 <a:theme xmlns:a="http://schemas.openxmlformats.org/drawingml/2006/main" name="Тема Office">
   <a:themeElements>

</xml_diff>